<commit_message>
pruned down some text in intro and added references.
</commit_message>
<xml_diff>
--- a/582_CSPoster.pptx
+++ b/582_CSPoster.pptx
@@ -3668,21 +3668,7 @@
                 <a:latin typeface="Kohinoor Bangla"/>
                 <a:cs typeface="Kohinoor Bangla"/>
               </a:rPr>
-              <a:t>C. </a:t>
-            </a:r>
-            <a:r>
-              <a:rPr lang="en-US" sz="5000" dirty="0" err="1" smtClean="0">
-                <a:latin typeface="Kohinoor Bangla"/>
-                <a:cs typeface="Kohinoor Bangla"/>
-              </a:rPr>
-              <a:t>Houferak</a:t>
-            </a:r>
-            <a:r>
-              <a:rPr lang="en-US" sz="5000" dirty="0" smtClean="0">
-                <a:latin typeface="Kohinoor Bangla"/>
-                <a:cs typeface="Kohinoor Bangla"/>
-              </a:rPr>
-              <a:t>, J. Kasper, J. J. </a:t>
+              <a:t>C. Houferak, J. Kasper, J. J. </a:t>
             </a:r>
             <a:r>
               <a:rPr lang="en-US" sz="5000" dirty="0" err="1" smtClean="0">
@@ -3698,10 +3684,6 @@
               </a:rPr>
               <a:t>, S. Sun</a:t>
             </a:r>
-            <a:endParaRPr lang="en-US" sz="5000" dirty="0" smtClean="0">
-              <a:latin typeface="Kohinoor Bangla"/>
-              <a:cs typeface="Kohinoor Bangla"/>
-            </a:endParaRPr>
           </a:p>
           <a:p>
             <a:pPr algn="ctr"/>
@@ -3710,16 +3692,9 @@
                 <a:latin typeface="Kohinoor Bangla"/>
                 <a:cs typeface="Kohinoor Bangla"/>
               </a:rPr>
-              <a:t>Li Research Group, </a:t>
-            </a:r>
-            <a:r>
-              <a:rPr lang="en-US" sz="5000" i="1" dirty="0" smtClean="0">
-                <a:latin typeface="Kohinoor Bangla"/>
-                <a:cs typeface="Kohinoor Bangla"/>
-              </a:rPr>
-              <a:t>University of Washington Department of Chemistry</a:t>
-            </a:r>
-            <a:endParaRPr lang="en-US" sz="5000" i="1" dirty="0">
+              <a:t>Li Research Group, University of Washington Department of Chemistry</a:t>
+            </a:r>
+            <a:endParaRPr lang="en-US" sz="5000" dirty="0">
               <a:latin typeface="Kohinoor Bangla"/>
               <a:cs typeface="Kohinoor Bangla"/>
             </a:endParaRPr>
@@ -3848,8 +3823,8 @@
         </p:nvSpPr>
         <p:spPr>
           <a:xfrm>
-            <a:off x="14956096" y="27399652"/>
-            <a:ext cx="14069892" cy="8631633"/>
+            <a:off x="14956096" y="25714194"/>
+            <a:ext cx="14069892" cy="10317091"/>
           </a:xfrm>
           <a:prstGeom prst="roundRect">
             <a:avLst/>
@@ -3895,7 +3870,7 @@
         </p:nvSpPr>
         <p:spPr>
           <a:xfrm>
-            <a:off x="17960527" y="26501819"/>
+            <a:off x="17960527" y="24883197"/>
             <a:ext cx="8327921" cy="830997"/>
           </a:xfrm>
           <a:prstGeom prst="rect">
@@ -3932,8 +3907,8 @@
         </p:nvSpPr>
         <p:spPr>
           <a:xfrm>
-            <a:off x="1261403" y="34733343"/>
-            <a:ext cx="12432923" cy="1569660"/>
+            <a:off x="1147276" y="34541537"/>
+            <a:ext cx="12432923" cy="2123658"/>
           </a:xfrm>
           <a:prstGeom prst="rect">
             <a:avLst/>
@@ -3951,32 +3926,83 @@
           </a:bodyPr>
           <a:lstStyle/>
           <a:p>
+            <a:pPr marL="457200" indent="-457200">
+              <a:buFont typeface="+mj-lt"/>
+              <a:buAutoNum type="arabicPeriod"/>
+            </a:pPr>
+            <a:r>
+              <a:rPr lang="en-US" sz="1800" dirty="0"/>
+              <a:t> X. Andrade, J. N. Sanders, and A. </a:t>
+            </a:r>
+            <a:r>
+              <a:rPr lang="en-US" sz="1800" dirty="0" err="1"/>
+              <a:t>Aspuru-Guzik</a:t>
+            </a:r>
+            <a:r>
+              <a:rPr lang="en-US" sz="1800" dirty="0"/>
+              <a:t>, </a:t>
+            </a:r>
+            <a:r>
+              <a:rPr lang="en-US" sz="1800" i="1" dirty="0"/>
+              <a:t>Application of compressed sensing to the simulation of atomic     systems, </a:t>
+            </a:r>
+            <a:r>
+              <a:rPr lang="en-US" sz="1800" dirty="0"/>
+              <a:t>PNAS. Vol. 109 (2012) pp.12938—13933. </a:t>
+            </a:r>
+          </a:p>
+          <a:p>
+            <a:pPr marL="457200" indent="-457200">
+              <a:buAutoNum type="arabicPeriod"/>
+            </a:pPr>
+            <a:r>
+              <a:rPr lang="en-US" sz="1800" dirty="0"/>
+              <a:t>J. N. </a:t>
+            </a:r>
+            <a:r>
+              <a:rPr lang="en-US" sz="1800" dirty="0" err="1"/>
+              <a:t>Kutz</a:t>
+            </a:r>
+            <a:r>
+              <a:rPr lang="en-US" sz="1800" i="1" dirty="0"/>
+              <a:t>, Ch. 17 Basics of Compressed Sensing, </a:t>
+            </a:r>
+            <a:r>
+              <a:rPr lang="en-US" sz="1800" dirty="0"/>
+              <a:t>AMATH 582 Course Notes. (2016). pp.395—418. </a:t>
+            </a:r>
+            <a:r>
+              <a:rPr lang="en-US" sz="1800" dirty="0">
+                <a:hlinkClick r:id="rId4"/>
+              </a:rPr>
+              <a:t>http://courses.washington.edu/amath582/582.pdf</a:t>
+            </a:r>
+            <a:r>
+              <a:rPr lang="en-US" sz="1800" dirty="0"/>
+              <a:t>.</a:t>
+            </a:r>
+          </a:p>
+          <a:p>
+            <a:pPr marL="457200" indent="-457200">
+              <a:buAutoNum type="arabicPeriod"/>
+            </a:pPr>
+            <a:r>
+              <a:rPr lang="en-US" sz="1800" dirty="0"/>
+              <a:t>E. van den Berg and M. P. Friedlander, </a:t>
+            </a:r>
+            <a:r>
+              <a:rPr lang="en-US" sz="1800" i="1" dirty="0"/>
+              <a:t>Probing the Pareto frontier for basis pursuit solutions</a:t>
+            </a:r>
+            <a:r>
+              <a:rPr lang="en-US" sz="1800" dirty="0"/>
+              <a:t>, SIAM J. on Scientific Computing, 31(2):890-912, November 2008</a:t>
+            </a:r>
+            <a:endParaRPr lang="en-US" sz="1800" i="1" dirty="0"/>
+          </a:p>
+          <a:p>
             <a:pPr algn="ctr"/>
-            <a:r>
-              <a:rPr lang="en-US" sz="2400" dirty="0" smtClean="0"/>
-              <a:t>REFERENCES WILL GO HERE</a:t>
-            </a:r>
-          </a:p>
-          <a:p>
-            <a:pPr algn="ctr"/>
-            <a:r>
-              <a:rPr lang="en-US" sz="2400" dirty="0" smtClean="0"/>
-              <a:t>REFERENCES WILL GO HERE</a:t>
-            </a:r>
-          </a:p>
-          <a:p>
-            <a:pPr algn="ctr"/>
-            <a:r>
-              <a:rPr lang="en-US" sz="2400" dirty="0" smtClean="0"/>
-              <a:t>REFERENCES WILL GO HERE </a:t>
-            </a:r>
-          </a:p>
-          <a:p>
-            <a:pPr algn="ctr"/>
-            <a:r>
-              <a:rPr lang="en-US" sz="2400" dirty="0" smtClean="0"/>
-              <a:t>REFERENCES WILL GO HERE</a:t>
-            </a:r>
+            <a:endParaRPr lang="en-US" sz="2400" dirty="0" smtClean="0"/>
           </a:p>
         </p:txBody>
       </p:sp>
@@ -4022,7 +4048,7 @@
         <p:spPr>
           <a:xfrm>
             <a:off x="14822407" y="5187527"/>
-            <a:ext cx="14161641" cy="21212692"/>
+            <a:ext cx="14161641" cy="19250995"/>
           </a:xfrm>
           <a:prstGeom prst="roundRect">
             <a:avLst/>
@@ -4067,7 +4093,7 @@
         <p:spPr>
           <a:xfrm>
             <a:off x="528640" y="5780054"/>
-            <a:ext cx="13644559" cy="14373165"/>
+            <a:ext cx="13644559" cy="19872107"/>
           </a:xfrm>
           <a:prstGeom prst="rect">
             <a:avLst/>
@@ -4082,170 +4108,42 @@
           <a:p>
             <a:pPr algn="just"/>
             <a:r>
-              <a:rPr lang="en-US" sz="2400" dirty="0"/>
-              <a:t>Computational chemistry seeks to construct models of chemical systems in order to model experimentally observable quantities in support of experimental research. A major implementation of computational modeling is simulating chemical spectra, which are essentially the 'fingerprints' of a chemical species. Spectra are typically obtained experimentally, but may also be generated computationally from first principles. </a:t>
-            </a:r>
-            <a:endParaRPr lang="en-US" sz="2400" dirty="0" smtClean="0"/>
+              <a:rPr lang="en-US" sz="2400" dirty="0" smtClean="0">
+                <a:latin typeface="Kohinoor Bangla"/>
+                <a:cs typeface="Kohinoor Bangla"/>
+              </a:rPr>
+              <a:t>               Computational chemistry seeks to construct models of chemical systems in </a:t>
+            </a:r>
           </a:p>
           <a:p>
             <a:pPr algn="just"/>
-            <a:endParaRPr lang="en-US" sz="2400" dirty="0"/>
+            <a:r>
+              <a:rPr lang="en-US" sz="2400" dirty="0" smtClean="0">
+                <a:latin typeface="Kohinoor Bangla"/>
+                <a:cs typeface="Kohinoor Bangla"/>
+              </a:rPr>
+              <a:t>           order to model experimentally observable quantities in support of experimental </a:t>
+            </a:r>
           </a:p>
           <a:p>
             <a:pPr algn="just"/>
             <a:r>
-              <a:rPr lang="en-US" sz="2400" dirty="0"/>
-              <a:t>Fine-grained computational models are often size-intensive with respect to simulation length and sampling rate. This study focuses on the Compressed Sensing (CS) technique for reducing the necessary sampling rate. CS assumes a high degree of </a:t>
-            </a:r>
-            <a:r>
-              <a:rPr lang="en-US" sz="2400" dirty="0" err="1"/>
-              <a:t>sparsity</a:t>
-            </a:r>
-            <a:r>
-              <a:rPr lang="en-US" sz="2400" dirty="0"/>
-              <a:t> in the frequency domain of a signal and makes use of the L</a:t>
-            </a:r>
-            <a:r>
-              <a:rPr lang="en-US" sz="2400" baseline="30000" dirty="0"/>
-              <a:t>1</a:t>
-            </a:r>
-            <a:r>
-              <a:rPr lang="en-US" sz="2400" dirty="0"/>
-              <a:t> norm minimization technique to locate an optimally sparse vector of transformation coefficients. Here we apply it to modeled Optical Absorption spectra that traditionally use Fourier analysis for frequency resolution. </a:t>
-            </a:r>
-            <a:endParaRPr lang="en-US" sz="2400" dirty="0" smtClean="0"/>
+              <a:rPr lang="en-US" sz="2400" dirty="0" smtClean="0">
+                <a:latin typeface="Kohinoor Bangla"/>
+                <a:cs typeface="Kohinoor Bangla"/>
+              </a:rPr>
+              <a:t>        research. A major implementation of computational modeling is simulating chemical</a:t>
+            </a:r>
           </a:p>
           <a:p>
             <a:pPr algn="just"/>
-            <a:endParaRPr lang="en-US" sz="2400" dirty="0"/>
-          </a:p>
-          <a:p>
-            <a:pPr algn="just"/>
-            <a:r>
-              <a:rPr lang="en-US" sz="2400" dirty="0"/>
-              <a:t>Absorption spectroscopy is an oft-utilized technique in chemistry that investigates how a molecule or material interacts with electromagnetic radiation in the ultraviolet and visible frequencies. When a particular frequency corresponds with the gap between energy levels of a molecule, electrons can be excited into higher molecular orbital. Thus, for a range of frequencies, spectra will show peaks at the frequencies corresponding to the energy level gaps. Absorbance features only occurring at molecular features of interest with characteristic frequencies implies </a:t>
-            </a:r>
-            <a:r>
-              <a:rPr lang="en-US" sz="2400" dirty="0" err="1"/>
-              <a:t>sparsity</a:t>
-            </a:r>
-            <a:r>
-              <a:rPr lang="en-US" sz="2400" dirty="0"/>
-              <a:t> in the frequency domain</a:t>
-            </a:r>
-            <a:r>
-              <a:rPr lang="en-US" sz="2400" dirty="0" smtClean="0"/>
-              <a:t>.</a:t>
-            </a:r>
-          </a:p>
-          <a:p>
-            <a:pPr algn="just"/>
-            <a:endParaRPr lang="en-US" sz="2400" dirty="0"/>
-          </a:p>
-          <a:p>
-            <a:pPr algn="just"/>
-            <a:r>
-              <a:rPr lang="en-US" sz="2400" dirty="0"/>
-              <a:t>Consider a signal h(t) that is sampled n times with a spacing ∆t. The set of Fourier coefficients that we wish to find for a set of frequencies </a:t>
-            </a:r>
-            <a:r>
-              <a:rPr lang="en-US" sz="2400" dirty="0" err="1"/>
-              <a:t>ω</a:t>
-            </a:r>
-            <a:r>
-              <a:rPr lang="en-US" sz="2400" baseline="-25000" dirty="0" err="1"/>
-              <a:t>k</a:t>
-            </a:r>
-            <a:r>
-              <a:rPr lang="en-US" sz="2400" dirty="0"/>
-              <a:t> are given by </a:t>
-            </a:r>
-            <a:r>
-              <a:rPr lang="en-US" sz="2400" dirty="0" err="1"/>
-              <a:t>g</a:t>
-            </a:r>
-            <a:r>
-              <a:rPr lang="en-US" sz="2400" baseline="-25000" dirty="0" err="1"/>
-              <a:t>k</a:t>
-            </a:r>
-            <a:r>
-              <a:rPr lang="en-US" sz="2400" dirty="0" err="1"/>
-              <a:t>.</a:t>
-            </a:r>
-            <a:r>
-              <a:rPr lang="en-US" sz="2400" dirty="0"/>
-              <a:t>, where </a:t>
-            </a:r>
-            <a:r>
-              <a:rPr lang="en-US" sz="2400" dirty="0" err="1"/>
-              <a:t>g</a:t>
-            </a:r>
-            <a:r>
-              <a:rPr lang="en-US" sz="2400" baseline="-25000" dirty="0" err="1"/>
-              <a:t>k</a:t>
-            </a:r>
-            <a:r>
-              <a:rPr lang="en-US" sz="2400" dirty="0"/>
-              <a:t> </a:t>
-            </a:r>
-            <a:r>
-              <a:rPr lang="en-US" sz="2400" dirty="0" smtClean="0"/>
-              <a:t>is given by</a:t>
-            </a:r>
-          </a:p>
-          <a:p>
-            <a:pPr algn="just"/>
-            <a:endParaRPr lang="en-US" sz="2400" dirty="0"/>
-          </a:p>
-          <a:p>
-            <a:pPr algn="just"/>
-            <a:endParaRPr lang="en-US" sz="2400" dirty="0"/>
-          </a:p>
-          <a:p>
-            <a:pPr algn="just"/>
-            <a:r>
-              <a:rPr lang="en-US" sz="2400" dirty="0"/>
-              <a:t>Casting this in matrix form, a Fourier matrix F is given by </a:t>
-            </a:r>
-            <a:endParaRPr lang="en-US" sz="2400" dirty="0" smtClean="0"/>
-          </a:p>
-          <a:p>
-            <a:pPr algn="just"/>
-            <a:endParaRPr lang="en-US" sz="2400" dirty="0"/>
-          </a:p>
-          <a:p>
-            <a:pPr algn="just"/>
-            <a:endParaRPr lang="en-US" sz="2400" dirty="0"/>
-          </a:p>
-          <a:p>
-            <a:pPr algn="just"/>
-            <a:r>
-              <a:rPr lang="en-US" sz="2400" dirty="0"/>
-              <a:t>so that the problem we wish to solve is simply </a:t>
-            </a:r>
-          </a:p>
-          <a:p>
-            <a:pPr algn="just"/>
-            <a:r>
-              <a:rPr lang="en-US" sz="2400" dirty="0" smtClean="0"/>
-              <a:t/>
-            </a:r>
-            <a:br>
-              <a:rPr lang="en-US" sz="2400" dirty="0" smtClean="0"/>
-            </a:br>
-            <a:endParaRPr lang="en-US" sz="2400" dirty="0" smtClean="0"/>
-          </a:p>
-          <a:p>
-            <a:pPr algn="just"/>
-            <a:endParaRPr lang="en-US" sz="2400" dirty="0" smtClean="0"/>
-          </a:p>
-          <a:p>
-            <a:pPr algn="just"/>
-            <a:endParaRPr lang="en-US" sz="2400" baseline="-25000" dirty="0" smtClean="0"/>
-          </a:p>
-          <a:p>
-            <a:pPr algn="just"/>
-            <a:endParaRPr lang="en-US" sz="2400" dirty="0" smtClean="0"/>
+            <a:r>
+              <a:rPr lang="en-US" sz="2400" dirty="0" smtClean="0">
+                <a:latin typeface="Kohinoor Bangla"/>
+                <a:cs typeface="Kohinoor Bangla"/>
+              </a:rPr>
+              <a:t>spectra, which are essentially the 'fingerprints' of a chemical species. Spectra are typically obtained experimentally, but may also be generated computationally from first principles. </a:t>
+            </a:r>
           </a:p>
           <a:p>
             <a:pPr algn="just"/>
@@ -4256,10 +4154,41 @@
           </a:p>
           <a:p>
             <a:pPr algn="just"/>
-            <a:endParaRPr lang="en-US" sz="2400" dirty="0" smtClean="0">
-              <a:latin typeface="Kohinoor Bangla"/>
-              <a:cs typeface="Kohinoor Bangla"/>
-            </a:endParaRPr>
+            <a:r>
+              <a:rPr lang="en-US" sz="2400" dirty="0" smtClean="0">
+                <a:latin typeface="Kohinoor Bangla"/>
+                <a:cs typeface="Kohinoor Bangla"/>
+              </a:rPr>
+              <a:t>Fine-grained computational models are often size-intensive with respect to simulation length and sampling rate. This study focuses on the Compressed Sensing (CS) technique for reducing the necessary sampling rate. CS assumes a high degree of </a:t>
+            </a:r>
+            <a:r>
+              <a:rPr lang="en-US" sz="2400" dirty="0" err="1" smtClean="0">
+                <a:latin typeface="Kohinoor Bangla"/>
+                <a:cs typeface="Kohinoor Bangla"/>
+              </a:rPr>
+              <a:t>sparsity</a:t>
+            </a:r>
+            <a:r>
+              <a:rPr lang="en-US" sz="2400" dirty="0" smtClean="0">
+                <a:latin typeface="Kohinoor Bangla"/>
+                <a:cs typeface="Kohinoor Bangla"/>
+              </a:rPr>
+              <a:t> in the frequency domain of a signal and makes use of the L</a:t>
+            </a:r>
+            <a:r>
+              <a:rPr lang="en-US" sz="2400" baseline="30000" dirty="0" smtClean="0">
+                <a:latin typeface="Kohinoor Bangla"/>
+                <a:cs typeface="Kohinoor Bangla"/>
+              </a:rPr>
+              <a:t>1</a:t>
+            </a:r>
+            <a:r>
+              <a:rPr lang="en-US" sz="2400" dirty="0" smtClean="0">
+                <a:latin typeface="Kohinoor Bangla"/>
+                <a:cs typeface="Kohinoor Bangla"/>
+              </a:rPr>
+              <a:t> norm minimization technique to locate an optimally sparse vector of transformation coefficients. Here we apply it to modeled Optical Absorption spectra that traditionally use Fourier analysis for frequency resolution. </a:t>
+            </a:r>
           </a:p>
           <a:p>
             <a:pPr algn="just"/>
@@ -4270,10 +4199,27 @@
           </a:p>
           <a:p>
             <a:pPr algn="just"/>
-            <a:endParaRPr lang="en-US" sz="2400" dirty="0">
-              <a:latin typeface="Kohinoor Bangla"/>
-              <a:cs typeface="Kohinoor Bangla"/>
-            </a:endParaRPr>
+            <a:r>
+              <a:rPr lang="en-US" sz="2400" dirty="0" smtClean="0">
+                <a:latin typeface="Kohinoor Bangla"/>
+                <a:cs typeface="Kohinoor Bangla"/>
+              </a:rPr>
+              <a:t>Absorption spectroscopy is an oft-utilized technique in chemistry that investigates how a molecule or material interacts with electromagnetic radiation in the ultraviolet and visible frequencies. When a particular frequency corresponds with the gap between energy levels of a molecule, electrons can be excited into higher molecular orbital. Thus, for a range of frequencies, spectra will show peaks at the frequencies corresponding to the energy level gaps. Absorbance features only occurring at molecular features of interest with characteristic frequencies implies </a:t>
+            </a:r>
+            <a:r>
+              <a:rPr lang="en-US" sz="2400" dirty="0" err="1" smtClean="0">
+                <a:latin typeface="Kohinoor Bangla"/>
+                <a:cs typeface="Kohinoor Bangla"/>
+              </a:rPr>
+              <a:t>sparsity</a:t>
+            </a:r>
+            <a:r>
+              <a:rPr lang="en-US" sz="2400" dirty="0" smtClean="0">
+                <a:latin typeface="Kohinoor Bangla"/>
+                <a:cs typeface="Kohinoor Bangla"/>
+              </a:rPr>
+              <a:t> in the frequency domain.</a:t>
+            </a:r>
           </a:p>
           <a:p>
             <a:pPr algn="just"/>
@@ -4284,6 +4230,86 @@
           </a:p>
           <a:p>
             <a:pPr algn="just"/>
+            <a:r>
+              <a:rPr lang="en-US" sz="2400" dirty="0" smtClean="0">
+                <a:latin typeface="Kohinoor Bangla"/>
+                <a:cs typeface="Kohinoor Bangla"/>
+              </a:rPr>
+              <a:t>Consider a signal h(t) that is sampled n times with a spacing ∆t. The set of Fourier coefficients that we wish to find for a set of frequencies </a:t>
+            </a:r>
+            <a:r>
+              <a:rPr lang="en-US" sz="2400" dirty="0" err="1" smtClean="0">
+                <a:latin typeface="Kohinoor Bangla"/>
+                <a:cs typeface="Kohinoor Bangla"/>
+              </a:rPr>
+              <a:t>ω</a:t>
+            </a:r>
+            <a:r>
+              <a:rPr lang="en-US" sz="2400" baseline="-25000" dirty="0" err="1" smtClean="0">
+                <a:latin typeface="Kohinoor Bangla"/>
+                <a:cs typeface="Kohinoor Bangla"/>
+              </a:rPr>
+              <a:t>k</a:t>
+            </a:r>
+            <a:r>
+              <a:rPr lang="en-US" sz="2400" dirty="0" smtClean="0">
+                <a:latin typeface="Kohinoor Bangla"/>
+                <a:cs typeface="Kohinoor Bangla"/>
+              </a:rPr>
+              <a:t> are given by </a:t>
+            </a:r>
+            <a:r>
+              <a:rPr lang="en-US" sz="2400" dirty="0" err="1" smtClean="0">
+                <a:latin typeface="Kohinoor Bangla"/>
+                <a:cs typeface="Kohinoor Bangla"/>
+              </a:rPr>
+              <a:t>g</a:t>
+            </a:r>
+            <a:r>
+              <a:rPr lang="en-US" sz="2400" baseline="-25000" dirty="0" err="1" smtClean="0">
+                <a:latin typeface="Kohinoor Bangla"/>
+                <a:cs typeface="Kohinoor Bangla"/>
+              </a:rPr>
+              <a:t>k</a:t>
+            </a:r>
+            <a:r>
+              <a:rPr lang="en-US" sz="2400" dirty="0" err="1" smtClean="0">
+                <a:latin typeface="Kohinoor Bangla"/>
+                <a:cs typeface="Kohinoor Bangla"/>
+              </a:rPr>
+              <a:t>.</a:t>
+            </a:r>
+            <a:r>
+              <a:rPr lang="en-US" sz="2400" dirty="0" smtClean="0">
+                <a:latin typeface="Kohinoor Bangla"/>
+                <a:cs typeface="Kohinoor Bangla"/>
+              </a:rPr>
+              <a:t>, where </a:t>
+            </a:r>
+            <a:r>
+              <a:rPr lang="en-US" sz="2400" dirty="0" err="1" smtClean="0">
+                <a:latin typeface="Kohinoor Bangla"/>
+                <a:cs typeface="Kohinoor Bangla"/>
+              </a:rPr>
+              <a:t>g</a:t>
+            </a:r>
+            <a:r>
+              <a:rPr lang="en-US" sz="2400" baseline="-25000" dirty="0" err="1" smtClean="0">
+                <a:latin typeface="Kohinoor Bangla"/>
+                <a:cs typeface="Kohinoor Bangla"/>
+              </a:rPr>
+              <a:t>k</a:t>
+            </a:r>
+            <a:r>
+              <a:rPr lang="en-US" sz="2400" dirty="0" smtClean="0">
+                <a:latin typeface="Kohinoor Bangla"/>
+                <a:cs typeface="Kohinoor Bangla"/>
+              </a:rPr>
+              <a:t> is given by</a:t>
+            </a:r>
+          </a:p>
+          <a:p>
+            <a:pPr algn="just"/>
             <a:endParaRPr lang="en-US" sz="2400" dirty="0" smtClean="0">
               <a:latin typeface="Kohinoor Bangla"/>
               <a:cs typeface="Kohinoor Bangla"/>
@@ -4291,7 +4317,330 @@
           </a:p>
           <a:p>
             <a:pPr algn="just"/>
+            <a:endParaRPr lang="en-US" sz="2400" dirty="0" smtClean="0">
+              <a:latin typeface="Kohinoor Bangla"/>
+              <a:cs typeface="Kohinoor Bangla"/>
+            </a:endParaRPr>
+          </a:p>
+          <a:p>
+            <a:pPr algn="just"/>
+            <a:endParaRPr lang="en-US" sz="2400" dirty="0" smtClean="0">
+              <a:latin typeface="Kohinoor Bangla"/>
+              <a:cs typeface="Kohinoor Bangla"/>
+            </a:endParaRPr>
+          </a:p>
+          <a:p>
+            <a:pPr algn="just"/>
+            <a:r>
+              <a:rPr lang="en-US" sz="2400" dirty="0" smtClean="0">
+                <a:latin typeface="Kohinoor Bangla"/>
+                <a:cs typeface="Kohinoor Bangla"/>
+              </a:rPr>
+              <a:t>Casting this in matrix form, a Fourier matrix F is given by </a:t>
+            </a:r>
+          </a:p>
+          <a:p>
+            <a:pPr algn="just"/>
+            <a:endParaRPr lang="en-US" sz="2400" dirty="0" smtClean="0">
+              <a:latin typeface="Kohinoor Bangla"/>
+              <a:cs typeface="Kohinoor Bangla"/>
+            </a:endParaRPr>
+          </a:p>
+          <a:p>
+            <a:pPr algn="just"/>
             <a:endParaRPr lang="en-US" sz="2400" dirty="0">
+              <a:latin typeface="Kohinoor Bangla"/>
+              <a:cs typeface="Kohinoor Bangla"/>
+            </a:endParaRPr>
+          </a:p>
+          <a:p>
+            <a:pPr algn="just"/>
+            <a:endParaRPr lang="en-US" sz="2400" dirty="0" smtClean="0">
+              <a:latin typeface="Kohinoor Bangla"/>
+              <a:cs typeface="Kohinoor Bangla"/>
+            </a:endParaRPr>
+          </a:p>
+          <a:p>
+            <a:pPr algn="just"/>
+            <a:r>
+              <a:rPr lang="en-US" sz="2400" dirty="0" smtClean="0">
+                <a:latin typeface="Kohinoor Bangla"/>
+                <a:cs typeface="Kohinoor Bangla"/>
+              </a:rPr>
+              <a:t>so that the problem we wish to solve is simply </a:t>
+            </a:r>
+          </a:p>
+          <a:p>
+            <a:pPr algn="just"/>
+            <a:endParaRPr lang="en-US" sz="2400" dirty="0" smtClean="0">
+              <a:latin typeface="Kohinoor Bangla"/>
+              <a:cs typeface="Kohinoor Bangla"/>
+            </a:endParaRPr>
+          </a:p>
+          <a:p>
+            <a:pPr algn="just"/>
+            <a:endParaRPr lang="en-US" sz="2400" dirty="0">
+              <a:latin typeface="Kohinoor Bangla"/>
+              <a:cs typeface="Kohinoor Bangla"/>
+            </a:endParaRPr>
+          </a:p>
+          <a:p>
+            <a:pPr algn="just"/>
+            <a:r>
+              <a:rPr lang="en-US" sz="2400" dirty="0">
+                <a:latin typeface="Kohinoor Bangla"/>
+                <a:cs typeface="Kohinoor Bangla"/>
+              </a:rPr>
+              <a:t>In the case that we assume N &gt; n, this system is underdetermined and will in general have multiple solutions. Yet since we know that we are looking for a sparse solution the task is to find the solution to </a:t>
+            </a:r>
+            <a:r>
+              <a:rPr lang="en-US" sz="2400" dirty="0" err="1" smtClean="0">
+                <a:latin typeface="Kohinoor Bangla"/>
+                <a:cs typeface="Kohinoor Bangla"/>
+              </a:rPr>
+              <a:t>Fg</a:t>
+            </a:r>
+            <a:r>
+              <a:rPr lang="en-US" sz="2400" dirty="0" smtClean="0">
+                <a:latin typeface="Kohinoor Bangla"/>
+                <a:cs typeface="Kohinoor Bangla"/>
+              </a:rPr>
+              <a:t> = h that </a:t>
+            </a:r>
+            <a:r>
+              <a:rPr lang="en-US" sz="2400" dirty="0">
+                <a:latin typeface="Kohinoor Bangla"/>
+                <a:cs typeface="Kohinoor Bangla"/>
+              </a:rPr>
+              <a:t>has the most coefficients </a:t>
+            </a:r>
+            <a:r>
+              <a:rPr lang="en-US" sz="2400" dirty="0" err="1">
+                <a:latin typeface="Kohinoor Bangla"/>
+                <a:cs typeface="Kohinoor Bangla"/>
+              </a:rPr>
+              <a:t>g</a:t>
+            </a:r>
+            <a:r>
+              <a:rPr lang="en-US" sz="2400" baseline="-25000" dirty="0" err="1">
+                <a:latin typeface="Kohinoor Bangla"/>
+                <a:cs typeface="Kohinoor Bangla"/>
+              </a:rPr>
+              <a:t>k</a:t>
+            </a:r>
+            <a:r>
+              <a:rPr lang="en-US" sz="2400" dirty="0">
+                <a:latin typeface="Kohinoor Bangla"/>
+                <a:cs typeface="Kohinoor Bangla"/>
+              </a:rPr>
+              <a:t> that are zero. This can be done algorithmically by minimizing the L</a:t>
+            </a:r>
+            <a:r>
+              <a:rPr lang="en-US" sz="2400" baseline="30000" dirty="0">
+                <a:latin typeface="Kohinoor Bangla"/>
+                <a:cs typeface="Kohinoor Bangla"/>
+              </a:rPr>
+              <a:t>1</a:t>
+            </a:r>
+            <a:r>
+              <a:rPr lang="en-US" sz="2400" dirty="0">
+                <a:latin typeface="Kohinoor Bangla"/>
+                <a:cs typeface="Kohinoor Bangla"/>
+              </a:rPr>
+              <a:t> norm of </a:t>
+            </a:r>
+            <a:r>
+              <a:rPr lang="en-US" sz="2400" dirty="0" smtClean="0">
+                <a:latin typeface="Kohinoor Bangla"/>
+                <a:cs typeface="Kohinoor Bangla"/>
+              </a:rPr>
+              <a:t>g. </a:t>
+            </a:r>
+            <a:r>
+              <a:rPr lang="en-US" sz="2400" dirty="0">
+                <a:latin typeface="Kohinoor Bangla"/>
+                <a:cs typeface="Kohinoor Bangla"/>
+              </a:rPr>
+              <a:t>In order to allow for some level of noise in the signal the constraint can be loosened. This procedure, called basis pursuit </a:t>
+            </a:r>
+            <a:r>
+              <a:rPr lang="en-US" sz="2400" dirty="0" err="1">
+                <a:latin typeface="Kohinoor Bangla"/>
+                <a:cs typeface="Kohinoor Bangla"/>
+              </a:rPr>
+              <a:t>denoising</a:t>
+            </a:r>
+            <a:r>
+              <a:rPr lang="en-US" sz="2400" dirty="0">
+                <a:latin typeface="Kohinoor Bangla"/>
+                <a:cs typeface="Kohinoor Bangla"/>
+              </a:rPr>
+              <a:t> (BPDN), </a:t>
+            </a:r>
+            <a:r>
+              <a:rPr lang="en-US" sz="2400" dirty="0" smtClean="0">
+                <a:latin typeface="Kohinoor Bangla"/>
+                <a:cs typeface="Kohinoor Bangla"/>
+              </a:rPr>
+              <a:t>is</a:t>
+            </a:r>
+          </a:p>
+          <a:p>
+            <a:pPr algn="just"/>
+            <a:r>
+              <a:rPr lang="en-US" sz="2400" dirty="0" smtClean="0">
+                <a:latin typeface="Kohinoor Bangla"/>
+                <a:cs typeface="Kohinoor Bangla"/>
+              </a:rPr>
+              <a:t>   given </a:t>
+            </a:r>
+            <a:r>
+              <a:rPr lang="en-US" sz="2400" dirty="0">
+                <a:latin typeface="Kohinoor Bangla"/>
+                <a:cs typeface="Kohinoor Bangla"/>
+              </a:rPr>
+              <a:t>by </a:t>
+            </a:r>
+            <a:endParaRPr lang="en-US" sz="2400" dirty="0" smtClean="0">
+              <a:latin typeface="Kohinoor Bangla"/>
+              <a:cs typeface="Kohinoor Bangla"/>
+            </a:endParaRPr>
+          </a:p>
+          <a:p>
+            <a:pPr algn="just"/>
+            <a:endParaRPr lang="en-US" sz="2400" dirty="0" smtClean="0">
+              <a:latin typeface="Kohinoor Bangla"/>
+              <a:cs typeface="Kohinoor Bangla"/>
+            </a:endParaRPr>
+          </a:p>
+          <a:p>
+            <a:pPr algn="just"/>
+            <a:endParaRPr lang="en-US" sz="2400" dirty="0">
+              <a:latin typeface="Kohinoor Bangla"/>
+              <a:cs typeface="Kohinoor Bangla"/>
+            </a:endParaRPr>
+          </a:p>
+          <a:p>
+            <a:pPr algn="just"/>
+            <a:r>
+              <a:rPr lang="en-US" sz="2400" dirty="0" smtClean="0">
+                <a:latin typeface="Kohinoor Bangla"/>
+                <a:cs typeface="Kohinoor Bangla"/>
+              </a:rPr>
+              <a:t>                    where </a:t>
+            </a:r>
+            <a:r>
+              <a:rPr lang="en-US" sz="2400" dirty="0" err="1">
+                <a:latin typeface="Kohinoor Bangla"/>
+                <a:cs typeface="Kohinoor Bangla"/>
+              </a:rPr>
+              <a:t>η</a:t>
+            </a:r>
+            <a:r>
+              <a:rPr lang="en-US" sz="2400" dirty="0">
+                <a:latin typeface="Kohinoor Bangla"/>
+                <a:cs typeface="Kohinoor Bangla"/>
+              </a:rPr>
+              <a:t> is a threshold level.</a:t>
+            </a:r>
+            <a:br>
+              <a:rPr lang="en-US" sz="2400" dirty="0">
+                <a:latin typeface="Kohinoor Bangla"/>
+                <a:cs typeface="Kohinoor Bangla"/>
+              </a:rPr>
+            </a:br>
+            <a:endParaRPr lang="en-US" sz="2400" dirty="0" smtClean="0">
+              <a:latin typeface="Kohinoor Bangla"/>
+              <a:cs typeface="Kohinoor Bangla"/>
+            </a:endParaRPr>
+          </a:p>
+          <a:p>
+            <a:pPr algn="just"/>
+            <a:endParaRPr lang="en-US" sz="2000" dirty="0" smtClean="0">
+              <a:latin typeface="Kohinoor Bangla"/>
+              <a:cs typeface="Kohinoor Bangla"/>
+            </a:endParaRPr>
+          </a:p>
+          <a:p>
+            <a:pPr algn="just"/>
+            <a:endParaRPr lang="en-US" sz="2000" dirty="0" smtClean="0">
+              <a:latin typeface="Kohinoor Bangla"/>
+              <a:cs typeface="Kohinoor Bangla"/>
+            </a:endParaRPr>
+          </a:p>
+          <a:p>
+            <a:pPr algn="just"/>
+            <a:endParaRPr lang="en-US" sz="2000" dirty="0" smtClean="0">
+              <a:latin typeface="Kohinoor Bangla"/>
+              <a:cs typeface="Kohinoor Bangla"/>
+            </a:endParaRPr>
+          </a:p>
+          <a:p>
+            <a:pPr algn="just"/>
+            <a:endParaRPr lang="en-US" sz="2000" dirty="0" smtClean="0">
+              <a:latin typeface="Kohinoor Bangla"/>
+              <a:cs typeface="Kohinoor Bangla"/>
+            </a:endParaRPr>
+          </a:p>
+          <a:p>
+            <a:pPr algn="just"/>
+            <a:endParaRPr lang="en-US" sz="2000" baseline="-25000" dirty="0" smtClean="0">
+              <a:latin typeface="Kohinoor Bangla"/>
+              <a:cs typeface="Kohinoor Bangla"/>
+            </a:endParaRPr>
+          </a:p>
+          <a:p>
+            <a:pPr algn="just"/>
+            <a:endParaRPr lang="en-US" sz="2000" dirty="0" smtClean="0">
+              <a:latin typeface="Kohinoor Bangla"/>
+              <a:cs typeface="Kohinoor Bangla"/>
+            </a:endParaRPr>
+          </a:p>
+          <a:p>
+            <a:pPr algn="just"/>
+            <a:endParaRPr lang="en-US" sz="2000" dirty="0" smtClean="0">
+              <a:latin typeface="Kohinoor Bangla"/>
+              <a:cs typeface="Kohinoor Bangla"/>
+            </a:endParaRPr>
+          </a:p>
+          <a:p>
+            <a:pPr algn="just"/>
+            <a:endParaRPr lang="en-US" sz="2000" dirty="0" smtClean="0">
+              <a:latin typeface="Kohinoor Bangla"/>
+              <a:cs typeface="Kohinoor Bangla"/>
+            </a:endParaRPr>
+          </a:p>
+          <a:p>
+            <a:pPr algn="just"/>
+            <a:endParaRPr lang="en-US" sz="2000" dirty="0" smtClean="0">
+              <a:latin typeface="Kohinoor Bangla"/>
+              <a:cs typeface="Kohinoor Bangla"/>
+            </a:endParaRPr>
+          </a:p>
+          <a:p>
+            <a:pPr algn="just"/>
+            <a:endParaRPr lang="en-US" sz="2000" dirty="0">
+              <a:latin typeface="Kohinoor Bangla"/>
+              <a:cs typeface="Kohinoor Bangla"/>
+            </a:endParaRPr>
+          </a:p>
+          <a:p>
+            <a:pPr algn="just"/>
+            <a:endParaRPr lang="en-US" sz="2000" dirty="0" smtClean="0">
+              <a:latin typeface="Kohinoor Bangla"/>
+              <a:cs typeface="Kohinoor Bangla"/>
+            </a:endParaRPr>
+          </a:p>
+          <a:p>
+            <a:pPr algn="just"/>
+            <a:endParaRPr lang="en-US" sz="2000" dirty="0" smtClean="0">
+              <a:latin typeface="Kohinoor Bangla"/>
+              <a:cs typeface="Kohinoor Bangla"/>
+            </a:endParaRPr>
+          </a:p>
+          <a:p>
+            <a:pPr algn="just"/>
+            <a:endParaRPr lang="en-US" sz="2000" dirty="0">
               <a:latin typeface="Kohinoor Bangla"/>
               <a:cs typeface="Kohinoor Bangla"/>
             </a:endParaRPr>
@@ -4399,7 +4748,7 @@
             <p:nvPr/>
           </p:nvPicPr>
           <p:blipFill rotWithShape="1">
-            <a:blip r:embed="rId4">
+            <a:blip r:embed="rId5">
               <a:extLst>
                 <a:ext uri="{28A0092B-C50C-407E-A947-70E740481C1C}">
                   <a14:useLocalDpi xmlns:a14="http://schemas.microsoft.com/office/drawing/2010/main" val="0"/>
@@ -4433,7 +4782,7 @@
             <p:nvPr/>
           </p:nvPicPr>
           <p:blipFill rotWithShape="1">
-            <a:blip r:embed="rId5">
+            <a:blip r:embed="rId6">
               <a:extLst>
                 <a:ext uri="{28A0092B-C50C-407E-A947-70E740481C1C}">
                   <a14:useLocalDpi xmlns:a14="http://schemas.microsoft.com/office/drawing/2010/main" val="0"/>
@@ -4569,7 +4918,7 @@
             <p:nvPr/>
           </p:nvPicPr>
           <p:blipFill>
-            <a:blip r:embed="rId6">
+            <a:blip r:embed="rId7">
               <a:extLst>
                 <a:ext uri="{28A0092B-C50C-407E-A947-70E740481C1C}">
                   <a14:useLocalDpi xmlns:a14="http://schemas.microsoft.com/office/drawing/2010/main" val="0"/>
@@ -4591,6 +4940,305 @@
           </p:spPr>
         </p:pic>
       </p:grpSp>
+      <p:pic>
+        <p:nvPicPr>
+          <p:cNvPr id="35" name="Picture 34" descr="latex-image-1.pdf"/>
+          <p:cNvPicPr>
+            <a:picLocks noChangeAspect="1"/>
+          </p:cNvPicPr>
+          <p:nvPr/>
+        </p:nvPicPr>
+        <p:blipFill>
+          <a:blip r:embed="rId8">
+            <a:extLst>
+              <a:ext uri="{28A0092B-C50C-407E-A947-70E740481C1C}">
+                <a14:useLocalDpi xmlns:a14="http://schemas.microsoft.com/office/drawing/2010/main" val="0"/>
+              </a:ext>
+            </a:extLst>
+          </a:blip>
+          <a:stretch>
+            <a:fillRect/>
+          </a:stretch>
+        </p:blipFill>
+        <p:spPr>
+          <a:xfrm>
+            <a:off x="6161087" y="14352544"/>
+            <a:ext cx="2841625" cy="818641"/>
+          </a:xfrm>
+          <a:prstGeom prst="rect">
+            <a:avLst/>
+          </a:prstGeom>
+        </p:spPr>
+      </p:pic>
+      <p:pic>
+        <p:nvPicPr>
+          <p:cNvPr id="36" name="Picture 35" descr="latex-image-1.pdf"/>
+          <p:cNvPicPr>
+            <a:picLocks noChangeAspect="1"/>
+          </p:cNvPicPr>
+          <p:nvPr/>
+        </p:nvPicPr>
+        <p:blipFill>
+          <a:blip r:embed="rId9">
+            <a:extLst>
+              <a:ext uri="{28A0092B-C50C-407E-A947-70E740481C1C}">
+                <a14:useLocalDpi xmlns:a14="http://schemas.microsoft.com/office/drawing/2010/main" val="0"/>
+              </a:ext>
+            </a:extLst>
+          </a:blip>
+          <a:stretch>
+            <a:fillRect/>
+          </a:stretch>
+        </p:blipFill>
+        <p:spPr>
+          <a:xfrm>
+            <a:off x="5932826" y="15831760"/>
+            <a:ext cx="3069886" cy="692596"/>
+          </a:xfrm>
+          <a:prstGeom prst="rect">
+            <a:avLst/>
+          </a:prstGeom>
+        </p:spPr>
+      </p:pic>
+      <p:pic>
+        <p:nvPicPr>
+          <p:cNvPr id="37" name="Picture 36" descr="latex-image-1.pdf"/>
+          <p:cNvPicPr>
+            <a:picLocks noChangeAspect="1"/>
+          </p:cNvPicPr>
+          <p:nvPr/>
+        </p:nvPicPr>
+        <p:blipFill>
+          <a:blip r:embed="rId10">
+            <a:extLst>
+              <a:ext uri="{28A0092B-C50C-407E-A947-70E740481C1C}">
+                <a14:useLocalDpi xmlns:a14="http://schemas.microsoft.com/office/drawing/2010/main" val="0"/>
+              </a:ext>
+            </a:extLst>
+          </a:blip>
+          <a:stretch>
+            <a:fillRect/>
+          </a:stretch>
+        </p:blipFill>
+        <p:spPr>
+          <a:xfrm>
+            <a:off x="6832600" y="17317317"/>
+            <a:ext cx="1117600" cy="312549"/>
+          </a:xfrm>
+          <a:prstGeom prst="rect">
+            <a:avLst/>
+          </a:prstGeom>
+        </p:spPr>
+      </p:pic>
+      <p:pic>
+        <p:nvPicPr>
+          <p:cNvPr id="38" name="Picture 37" descr="latex-image-1.pdf"/>
+          <p:cNvPicPr>
+            <a:picLocks noChangeAspect="1"/>
+          </p:cNvPicPr>
+          <p:nvPr/>
+        </p:nvPicPr>
+        <p:blipFill>
+          <a:blip r:embed="rId11">
+            <a:extLst>
+              <a:ext uri="{28A0092B-C50C-407E-A947-70E740481C1C}">
+                <a14:useLocalDpi xmlns:a14="http://schemas.microsoft.com/office/drawing/2010/main" val="0"/>
+              </a:ext>
+            </a:extLst>
+          </a:blip>
+          <a:stretch>
+            <a:fillRect/>
+          </a:stretch>
+        </p:blipFill>
+        <p:spPr>
+          <a:xfrm>
+            <a:off x="5011857" y="19983466"/>
+            <a:ext cx="4703762" cy="500400"/>
+          </a:xfrm>
+          <a:prstGeom prst="rect">
+            <a:avLst/>
+          </a:prstGeom>
+        </p:spPr>
+      </p:pic>
+      <p:pic>
+        <p:nvPicPr>
+          <p:cNvPr id="39" name="Picture 38" descr="IdealCase_H2O.png"/>
+          <p:cNvPicPr>
+            <a:picLocks noChangeAspect="1"/>
+          </p:cNvPicPr>
+          <p:nvPr/>
+        </p:nvPicPr>
+        <p:blipFill rotWithShape="1">
+          <a:blip r:embed="rId12">
+            <a:extLst>
+              <a:ext uri="{28A0092B-C50C-407E-A947-70E740481C1C}">
+                <a14:useLocalDpi xmlns:a14="http://schemas.microsoft.com/office/drawing/2010/main" val="0"/>
+              </a:ext>
+            </a:extLst>
+          </a:blip>
+          <a:srcRect l="6697" r="6731" b="4667"/>
+          <a:stretch/>
+        </p:blipFill>
+        <p:spPr>
+          <a:xfrm>
+            <a:off x="15905950" y="7009333"/>
+            <a:ext cx="4477428" cy="3697941"/>
+          </a:xfrm>
+          <a:prstGeom prst="rect">
+            <a:avLst/>
+          </a:prstGeom>
+        </p:spPr>
+      </p:pic>
+      <p:pic>
+        <p:nvPicPr>
+          <p:cNvPr id="40" name="Picture 39" descr="400pts_damp10_dipole.png"/>
+          <p:cNvPicPr>
+            <a:picLocks noChangeAspect="1"/>
+          </p:cNvPicPr>
+          <p:nvPr/>
+        </p:nvPicPr>
+        <p:blipFill>
+          <a:blip r:embed="rId13">
+            <a:extLst>
+              <a:ext uri="{28A0092B-C50C-407E-A947-70E740481C1C}">
+                <a14:useLocalDpi xmlns:a14="http://schemas.microsoft.com/office/drawing/2010/main" val="0"/>
+              </a:ext>
+            </a:extLst>
+          </a:blip>
+          <a:stretch>
+            <a:fillRect/>
+          </a:stretch>
+        </p:blipFill>
+        <p:spPr>
+          <a:xfrm>
+            <a:off x="21023162" y="6521450"/>
+            <a:ext cx="5735303" cy="5194546"/>
+          </a:xfrm>
+          <a:prstGeom prst="rect">
+            <a:avLst/>
+          </a:prstGeom>
+        </p:spPr>
+      </p:pic>
+      <p:pic>
+        <p:nvPicPr>
+          <p:cNvPr id="42" name="Picture 41" descr="blossoms.png"/>
+          <p:cNvPicPr>
+            <a:picLocks noChangeAspect="1"/>
+          </p:cNvPicPr>
+          <p:nvPr/>
+        </p:nvPicPr>
+        <p:blipFill>
+          <a:blip r:embed="rId14">
+            <a:extLst>
+              <a:ext uri="{28A0092B-C50C-407E-A947-70E740481C1C}">
+                <a14:useLocalDpi xmlns:a14="http://schemas.microsoft.com/office/drawing/2010/main" val="0"/>
+              </a:ext>
+            </a:extLst>
+          </a:blip>
+          <a:stretch>
+            <a:fillRect/>
+          </a:stretch>
+        </p:blipFill>
+        <p:spPr>
+          <a:xfrm>
+            <a:off x="24381472" y="38486"/>
+            <a:ext cx="4859094" cy="3697466"/>
+          </a:xfrm>
+          <a:prstGeom prst="rect">
+            <a:avLst/>
+          </a:prstGeom>
+        </p:spPr>
+      </p:pic>
+      <p:pic>
+        <p:nvPicPr>
+          <p:cNvPr id="43" name="Picture 42" descr="FT_ssComp.png"/>
+          <p:cNvPicPr>
+            <a:picLocks noChangeAspect="1"/>
+          </p:cNvPicPr>
+          <p:nvPr/>
+        </p:nvPicPr>
+        <p:blipFill>
+          <a:blip r:embed="rId15">
+            <a:extLst>
+              <a:ext uri="{28A0092B-C50C-407E-A947-70E740481C1C}">
+                <a14:useLocalDpi xmlns:a14="http://schemas.microsoft.com/office/drawing/2010/main" val="0"/>
+              </a:ext>
+            </a:extLst>
+          </a:blip>
+          <a:stretch>
+            <a:fillRect/>
+          </a:stretch>
+        </p:blipFill>
+        <p:spPr>
+          <a:xfrm>
+            <a:off x="15033060" y="11263120"/>
+            <a:ext cx="6450721" cy="4838041"/>
+          </a:xfrm>
+          <a:prstGeom prst="rect">
+            <a:avLst/>
+          </a:prstGeom>
+        </p:spPr>
+      </p:pic>
+      <p:pic>
+        <p:nvPicPr>
+          <p:cNvPr id="44" name="Picture 43" descr="lowss_CS.png"/>
+          <p:cNvPicPr>
+            <a:picLocks noChangeAspect="1"/>
+          </p:cNvPicPr>
+          <p:nvPr/>
+        </p:nvPicPr>
+        <p:blipFill>
+          <a:blip r:embed="rId16">
+            <a:extLst>
+              <a:ext uri="{28A0092B-C50C-407E-A947-70E740481C1C}">
+                <a14:useLocalDpi xmlns:a14="http://schemas.microsoft.com/office/drawing/2010/main" val="0"/>
+              </a:ext>
+            </a:extLst>
+          </a:blip>
+          <a:stretch>
+            <a:fillRect/>
+          </a:stretch>
+        </p:blipFill>
+        <p:spPr>
+          <a:xfrm>
+            <a:off x="15464394" y="16524356"/>
+            <a:ext cx="6222943" cy="4667207"/>
+          </a:xfrm>
+          <a:prstGeom prst="rect">
+            <a:avLst/>
+          </a:prstGeom>
+        </p:spPr>
+      </p:pic>
+      <p:pic>
+        <p:nvPicPr>
+          <p:cNvPr id="45" name="Picture 44" descr="wandwoDamping.png"/>
+          <p:cNvPicPr>
+            <a:picLocks noChangeAspect="1"/>
+          </p:cNvPicPr>
+          <p:nvPr/>
+        </p:nvPicPr>
+        <p:blipFill>
+          <a:blip r:embed="rId17">
+            <a:extLst>
+              <a:ext uri="{28A0092B-C50C-407E-A947-70E740481C1C}">
+                <a14:useLocalDpi xmlns:a14="http://schemas.microsoft.com/office/drawing/2010/main" val="0"/>
+              </a:ext>
+            </a:extLst>
+          </a:blip>
+          <a:stretch>
+            <a:fillRect/>
+          </a:stretch>
+        </p:blipFill>
+        <p:spPr>
+          <a:xfrm>
+            <a:off x="21687337" y="11780847"/>
+            <a:ext cx="6324678" cy="4743509"/>
+          </a:xfrm>
+          <a:prstGeom prst="rect">
+            <a:avLst/>
+          </a:prstGeom>
+        </p:spPr>
+      </p:pic>
     </p:spTree>
     <p:extLst>
       <p:ext uri="{BB962C8B-B14F-4D97-AF65-F5344CB8AC3E}">

</xml_diff>

<commit_message>
Added to the summary and conlusions section of the poster.
</commit_message>
<xml_diff>
--- a/582_CSPoster.pptx
+++ b/582_CSPoster.pptx
@@ -109,7 +109,7 @@
   </p:defaultTextStyle>
   <p:extLst>
     <p:ext uri="{EFAFB233-063F-42B5-8137-9DF3F51BA10A}">
-      <p15:sldGuideLst xmlns:p15="http://schemas.microsoft.com/office/powerpoint/2012/main">
+      <p15:sldGuideLst xmlns:p15="http://schemas.microsoft.com/office/powerpoint/2012/main" xmlns="">
         <p15:guide id="1" orient="horz" pos="11520">
           <p15:clr>
             <a:srgbClr val="A4A3A4"/>
@@ -5239,6 +5239,88 @@
           </a:prstGeom>
         </p:spPr>
       </p:pic>
+      <p:sp>
+        <p:nvSpPr>
+          <p:cNvPr id="2" name="TextBox 1"/>
+          <p:cNvSpPr txBox="1"/>
+          <p:nvPr/>
+        </p:nvSpPr>
+        <p:spPr>
+          <a:xfrm>
+            <a:off x="15033060" y="26476194"/>
+            <a:ext cx="13950988" cy="4154983"/>
+          </a:xfrm>
+          <a:prstGeom prst="rect">
+            <a:avLst/>
+          </a:prstGeom>
+          <a:noFill/>
+        </p:spPr>
+        <p:txBody>
+          <a:bodyPr wrap="square" rtlCol="0">
+            <a:spAutoFit/>
+          </a:bodyPr>
+          <a:lstStyle/>
+          <a:p>
+            <a:r>
+              <a:rPr lang="en-US" sz="2400" dirty="0">
+                <a:latin typeface="Kohinoor Bangla"/>
+                <a:cs typeface="Kohinoor Bangla"/>
+              </a:rPr>
+              <a:t>As shown above, the compressed sensing technique was able to capture the absorption spectrum to a least semi-quantitative accuracy. In practice this is good enough for most applications. This has profound implications for the computational chemistry community as it allows for highly accurate calculations to be run for a shorter period of time without sacrificing much in the quality of results</a:t>
+            </a:r>
+            <a:r>
+              <a:rPr lang="en-US" sz="2400" dirty="0" smtClean="0">
+                <a:latin typeface="Kohinoor Bangla"/>
+                <a:cs typeface="Kohinoor Bangla"/>
+              </a:rPr>
+              <a:t>.</a:t>
+            </a:r>
+          </a:p>
+          <a:p>
+            <a:endParaRPr lang="en-US" sz="2400" dirty="0">
+              <a:latin typeface="Kohinoor Bangla"/>
+              <a:cs typeface="Kohinoor Bangla"/>
+            </a:endParaRPr>
+          </a:p>
+          <a:p>
+            <a:r>
+              <a:rPr lang="en-US" sz="2400" dirty="0">
+                <a:latin typeface="Kohinoor Bangla"/>
+                <a:cs typeface="Kohinoor Bangla"/>
+              </a:rPr>
+              <a:t>Our tests above utilized the SPGL1 basis pursuit method due to its speed advantage over other </a:t>
+            </a:r>
+            <a:r>
+              <a:rPr lang="en-US" sz="2400" i="1" dirty="0" smtClean="0">
+                <a:latin typeface="Kohinoor Bangla"/>
+                <a:cs typeface="Kohinoor Bangla"/>
+              </a:rPr>
+              <a:t>L</a:t>
+            </a:r>
+            <a:r>
+              <a:rPr lang="en-US" sz="2400" i="1" baseline="30000" dirty="0" smtClean="0">
+                <a:latin typeface="Kohinoor Bangla"/>
+                <a:cs typeface="Kohinoor Bangla"/>
+              </a:rPr>
+              <a:t>1</a:t>
+            </a:r>
+            <a:r>
+              <a:rPr lang="en-US" sz="2400" dirty="0" smtClean="0">
+                <a:latin typeface="Kohinoor Bangla"/>
+                <a:cs typeface="Kohinoor Bangla"/>
+              </a:rPr>
+              <a:t> </a:t>
+            </a:r>
+            <a:r>
+              <a:rPr lang="en-US" sz="2400" dirty="0">
+                <a:latin typeface="Kohinoor Bangla"/>
+                <a:cs typeface="Kohinoor Bangla"/>
+              </a:rPr>
+              <a:t>minimization algorithms such as CVX. However, other possible methods for further reducing the time of calculation include running a coarse calculation first to determine key windows of interest, followed by a second fine-grained spectra (artificially setting some of the rows in the Fourier matrix to zero).</a:t>
+            </a:r>
+          </a:p>
+        </p:txBody>
+      </p:sp>
     </p:spTree>
     <p:extLst>
       <p:ext uri="{BB962C8B-B14F-4D97-AF65-F5344CB8AC3E}">

</xml_diff>